<commit_message>
Updates to BGA poster
</commit_message>
<xml_diff>
--- a/BGA poster.pptx
+++ b/BGA poster.pptx
@@ -109,13 +109,7 @@
   </p:defaultTextStyle>
   <p:extLst>
     <p:ext uri="{EFAFB233-063F-42B5-8137-9DF3F51BA10A}">
-      <p15:sldGuideLst xmlns:p15="http://schemas.microsoft.com/office/powerpoint/2012/main">
-        <p15:guide id="1" orient="horz" pos="26658" userDrawn="1">
-          <p15:clr>
-            <a:srgbClr val="A4A3A4"/>
-          </p15:clr>
-        </p15:guide>
-      </p15:sldGuideLst>
+      <p15:sldGuideLst xmlns:p15="http://schemas.microsoft.com/office/powerpoint/2012/main"/>
     </p:ext>
   </p:extLst>
 </p:presentation>
@@ -202,7 +196,7 @@
           </a:lstStyle>
           <a:p>
             <a:fld id="{D2567641-262C-694E-B091-00EFD32D4713}" type="datetimeFigureOut">
-              <a:t>5/31/22</a:t>
+              <a:t>6/1/22</a:t>
             </a:fld>
             <a:endParaRPr lang="en-US"/>
           </a:p>
@@ -682,7 +676,7 @@
           <a:lstStyle/>
           <a:p>
             <a:fld id="{9637D726-9F5E-AA44-9F67-0DCD166023F2}" type="datetimeFigureOut">
-              <a:t>5/31/22</a:t>
+              <a:t>6/1/22</a:t>
             </a:fld>
             <a:endParaRPr lang="en-US"/>
           </a:p>
@@ -850,7 +844,7 @@
           <a:lstStyle/>
           <a:p>
             <a:fld id="{9637D726-9F5E-AA44-9F67-0DCD166023F2}" type="datetimeFigureOut">
-              <a:t>5/31/22</a:t>
+              <a:t>6/1/22</a:t>
             </a:fld>
             <a:endParaRPr lang="en-US"/>
           </a:p>
@@ -1028,7 +1022,7 @@
           <a:lstStyle/>
           <a:p>
             <a:fld id="{9637D726-9F5E-AA44-9F67-0DCD166023F2}" type="datetimeFigureOut">
-              <a:t>5/31/22</a:t>
+              <a:t>6/1/22</a:t>
             </a:fld>
             <a:endParaRPr lang="en-US"/>
           </a:p>
@@ -1196,7 +1190,7 @@
           <a:lstStyle/>
           <a:p>
             <a:fld id="{9637D726-9F5E-AA44-9F67-0DCD166023F2}" type="datetimeFigureOut">
-              <a:t>5/31/22</a:t>
+              <a:t>6/1/22</a:t>
             </a:fld>
             <a:endParaRPr lang="en-US"/>
           </a:p>
@@ -1438,7 +1432,7 @@
           <a:lstStyle/>
           <a:p>
             <a:fld id="{9637D726-9F5E-AA44-9F67-0DCD166023F2}" type="datetimeFigureOut">
-              <a:t>5/31/22</a:t>
+              <a:t>6/1/22</a:t>
             </a:fld>
             <a:endParaRPr lang="en-US"/>
           </a:p>
@@ -1668,7 +1662,7 @@
           <a:lstStyle/>
           <a:p>
             <a:fld id="{9637D726-9F5E-AA44-9F67-0DCD166023F2}" type="datetimeFigureOut">
-              <a:t>5/31/22</a:t>
+              <a:t>6/1/22</a:t>
             </a:fld>
             <a:endParaRPr lang="en-US"/>
           </a:p>
@@ -2033,7 +2027,7 @@
           <a:lstStyle/>
           <a:p>
             <a:fld id="{9637D726-9F5E-AA44-9F67-0DCD166023F2}" type="datetimeFigureOut">
-              <a:t>5/31/22</a:t>
+              <a:t>6/1/22</a:t>
             </a:fld>
             <a:endParaRPr lang="en-US"/>
           </a:p>
@@ -2149,7 +2143,7 @@
           <a:lstStyle/>
           <a:p>
             <a:fld id="{9637D726-9F5E-AA44-9F67-0DCD166023F2}" type="datetimeFigureOut">
-              <a:t>5/31/22</a:t>
+              <a:t>6/1/22</a:t>
             </a:fld>
             <a:endParaRPr lang="en-US"/>
           </a:p>
@@ -2242,7 +2236,7 @@
           <a:lstStyle/>
           <a:p>
             <a:fld id="{9637D726-9F5E-AA44-9F67-0DCD166023F2}" type="datetimeFigureOut">
-              <a:t>5/31/22</a:t>
+              <a:t>6/1/22</a:t>
             </a:fld>
             <a:endParaRPr lang="en-US"/>
           </a:p>
@@ -2517,7 +2511,7 @@
           <a:lstStyle/>
           <a:p>
             <a:fld id="{9637D726-9F5E-AA44-9F67-0DCD166023F2}" type="datetimeFigureOut">
-              <a:t>5/31/22</a:t>
+              <a:t>6/1/22</a:t>
             </a:fld>
             <a:endParaRPr lang="en-US"/>
           </a:p>
@@ -2772,7 +2766,7 @@
           <a:lstStyle/>
           <a:p>
             <a:fld id="{9637D726-9F5E-AA44-9F67-0DCD166023F2}" type="datetimeFigureOut">
-              <a:t>5/31/22</a:t>
+              <a:t>6/1/22</a:t>
             </a:fld>
             <a:endParaRPr lang="en-US"/>
           </a:p>
@@ -2983,7 +2977,7 @@
           </a:lstStyle>
           <a:p>
             <a:fld id="{9637D726-9F5E-AA44-9F67-0DCD166023F2}" type="datetimeFigureOut">
-              <a:t>5/31/22</a:t>
+              <a:t>6/1/22</a:t>
             </a:fld>
             <a:endParaRPr lang="en-US"/>
           </a:p>
@@ -3417,8 +3411,8 @@
         </p:blipFill>
         <p:spPr bwMode="auto">
           <a:xfrm>
-            <a:off x="15507309" y="20624492"/>
-            <a:ext cx="1169324" cy="479910"/>
+            <a:off x="15648534" y="20527642"/>
+            <a:ext cx="1085390" cy="445462"/>
           </a:xfrm>
           <a:prstGeom prst="rect">
             <a:avLst/>
@@ -3449,7 +3443,7 @@
         </p:nvSpPr>
         <p:spPr>
           <a:xfrm>
-            <a:off x="1690920" y="1894839"/>
+            <a:off x="1690920" y="1798587"/>
             <a:ext cx="26260425" cy="3785652"/>
           </a:xfrm>
           <a:prstGeom prst="rect">
@@ -3493,7 +3487,7 @@
         </p:nvSpPr>
         <p:spPr>
           <a:xfrm>
-            <a:off x="1769163" y="5749770"/>
+            <a:off x="1769163" y="5653518"/>
             <a:ext cx="26182182" cy="1754326"/>
           </a:xfrm>
           <a:prstGeom prst="rect">
@@ -3549,7 +3543,7 @@
                 </a:solidFill>
                 <a:latin typeface="Abadi MT Condensed Light" panose="020B0306030101010103" pitchFamily="34" charset="77"/>
               </a:rPr>
-              <a:t>Amsterdam UMC a.abdellaoui@amsterdamumc.nl        @dr_appie</a:t>
+              <a:t>Amsterdam UMC a.abdellaoui@amsterdamumc.nl       @dr_appie</a:t>
             </a:r>
           </a:p>
         </p:txBody>
@@ -3568,7 +3562,7 @@
         </p:nvSpPr>
         <p:spPr>
           <a:xfrm>
-            <a:off x="1692397" y="8288730"/>
+            <a:off x="1692397" y="8192478"/>
             <a:ext cx="26658766" cy="2308324"/>
           </a:xfrm>
           <a:prstGeom prst="rect">
@@ -3744,7 +3738,7 @@
         </p:nvSpPr>
         <p:spPr>
           <a:xfrm>
-            <a:off x="21814971" y="11127467"/>
+            <a:off x="11868538" y="11270865"/>
             <a:ext cx="6788600" cy="5788933"/>
           </a:xfrm>
           <a:prstGeom prst="rect">
@@ -3771,7 +3765,7 @@
         </p:style>
         <p:txBody>
           <a:bodyPr wrap="square" rtlCol="0">
-            <a:normAutofit lnSpcReduction="10000"/>
+            <a:normAutofit fontScale="92500" lnSpcReduction="10000"/>
           </a:bodyPr>
           <a:lstStyle/>
           <a:p>
@@ -3780,36 +3774,42 @@
                 <a:latin typeface="Futura Medium" panose="020B0602020204020303" pitchFamily="34" charset="-79"/>
                 <a:cs typeface="Futura Medium" panose="020B0602020204020303" pitchFamily="34" charset="-79"/>
               </a:rPr>
-              <a:t>Among UK Biobank respondents with completed fertility, we correlate 33 polygenic scores with </a:t>
-            </a:r>
-            <a:r>
-              <a:rPr lang="en-US" sz="2800" b="1">
+              <a:t>Among 348,595 UK Biobank respondents with completed fertility, we correlate 33 polygenic scores with </a:t>
+            </a:r>
+            <a:r>
+              <a:rPr lang="en-US" sz="2800">
+                <a:solidFill>
+                  <a:srgbClr val="4682B4"/>
+                </a:solidFill>
                 <a:latin typeface="Futura Medium" panose="020B0602020204020303" pitchFamily="34" charset="-79"/>
                 <a:cs typeface="Futura Medium" panose="020B0602020204020303" pitchFamily="34" charset="-79"/>
               </a:rPr>
-              <a:t>relative lifetime reproductive success (RLRS)</a:t>
-            </a:r>
+              <a:t>relative lifetime reproductive success </a:t>
+            </a:r>
+            <a:r>
+              <a:rPr lang="en-US" sz="2800">
+                <a:solidFill>
+                  <a:schemeClr val="tx1"/>
+                </a:solidFill>
+                <a:latin typeface="Futura Medium" panose="020B0602020204020303" pitchFamily="34" charset="-79"/>
+                <a:cs typeface="Futura Medium" panose="020B0602020204020303" pitchFamily="34" charset="-79"/>
+              </a:rPr>
+              <a:t>(RLRS).</a:t>
+            </a:r>
+          </a:p>
+          <a:p>
+            <a:endParaRPr lang="en-US" sz="2800">
+              <a:latin typeface="Futura Medium" panose="020B0602020204020303" pitchFamily="34" charset="-79"/>
+              <a:cs typeface="Futura Medium" panose="020B0602020204020303" pitchFamily="34" charset="-79"/>
+            </a:endParaRPr>
+          </a:p>
+          <a:p>
             <a:r>
               <a:rPr lang="en-US" sz="2800">
                 <a:latin typeface="Futura Medium" panose="020B0602020204020303" pitchFamily="34" charset="-79"/>
                 <a:cs typeface="Futura Medium" panose="020B0602020204020303" pitchFamily="34" charset="-79"/>
               </a:rPr>
-              <a:t>.</a:t>
-            </a:r>
-          </a:p>
-          <a:p>
-            <a:endParaRPr lang="en-US" sz="2800">
-              <a:latin typeface="Futura Medium" panose="020B0602020204020303" pitchFamily="34" charset="-79"/>
-              <a:cs typeface="Futura Medium" panose="020B0602020204020303" pitchFamily="34" charset="-79"/>
-            </a:endParaRPr>
-          </a:p>
-          <a:p>
-            <a:r>
-              <a:rPr lang="en-US" sz="2800">
-                <a:latin typeface="Futura Medium" panose="020B0602020204020303" pitchFamily="34" charset="-79"/>
-                <a:cs typeface="Futura Medium" panose="020B0602020204020303" pitchFamily="34" charset="-79"/>
-              </a:rPr>
-              <a:t>Effect sizes are equal to the expected normalized PGS in the next generation.</a:t>
+              <a:t>Effect sizes are equal to the expected normalized polygenic score in the next generation.</a:t>
             </a:r>
           </a:p>
           <a:p>
@@ -3865,7 +3865,7 @@
         </p:blipFill>
         <p:spPr>
           <a:xfrm>
-            <a:off x="11457040" y="11127467"/>
+            <a:off x="19414616" y="11053391"/>
             <a:ext cx="9305813" cy="5722924"/>
           </a:xfrm>
           <a:prstGeom prst="rect">
@@ -3894,8 +3894,8 @@
         </p:blipFill>
         <p:spPr>
           <a:xfrm>
-            <a:off x="1908207" y="11401183"/>
-            <a:ext cx="8860737" cy="5449208"/>
+            <a:off x="1884387" y="11270865"/>
+            <a:ext cx="9306000" cy="5723038"/>
           </a:xfrm>
           <a:prstGeom prst="rect">
             <a:avLst/>
@@ -4137,7 +4137,7 @@
         </p:blipFill>
         <p:spPr>
           <a:xfrm>
-            <a:off x="1692397" y="36081538"/>
+            <a:off x="1884387" y="36066441"/>
             <a:ext cx="9304439" cy="5722079"/>
           </a:xfrm>
           <a:prstGeom prst="rect">
@@ -4370,8 +4370,8 @@
         </p:nvCxnSpPr>
         <p:spPr>
           <a:xfrm rot="5400000">
-            <a:off x="15809402" y="22906116"/>
-            <a:ext cx="2119569" cy="799059"/>
+            <a:off x="15910755" y="22828485"/>
+            <a:ext cx="1940588" cy="775341"/>
           </a:xfrm>
           <a:prstGeom prst="curvedConnector3">
             <a:avLst>
@@ -4416,8 +4416,8 @@
         </p:nvCxnSpPr>
         <p:spPr>
           <a:xfrm rot="16200000" flipH="1">
-            <a:off x="17056175" y="22880716"/>
-            <a:ext cx="2119571" cy="799058"/>
+            <a:off x="17157085" y="22779804"/>
+            <a:ext cx="1965993" cy="847301"/>
           </a:xfrm>
           <a:prstGeom prst="curvedConnector3">
             <a:avLst>
@@ -4446,12 +4446,229 @@
           </a:fontRef>
         </p:style>
       </p:cxnSp>
+      <p:sp>
+        <p:nvSpPr>
+          <p:cNvPr id="1030" name="TextBox 1029">
+            <a:extLst>
+              <a:ext uri="{FF2B5EF4-FFF2-40B4-BE49-F238E27FC236}">
+                <a16:creationId xmlns:a16="http://schemas.microsoft.com/office/drawing/2014/main" id="{0F51016D-E099-1736-D48F-1D0CF34CBD79}"/>
+              </a:ext>
+            </a:extLst>
+          </p:cNvPr>
+          <p:cNvSpPr txBox="1"/>
+          <p:nvPr/>
+        </p:nvSpPr>
+        <p:spPr>
+          <a:xfrm>
+            <a:off x="18423210" y="20618478"/>
+            <a:ext cx="2654370" cy="1477328"/>
+          </a:xfrm>
+          <a:prstGeom prst="rect">
+            <a:avLst/>
+          </a:prstGeom>
+          <a:noFill/>
+        </p:spPr>
+        <p:txBody>
+          <a:bodyPr wrap="square" rtlCol="0">
+            <a:spAutoFit/>
+          </a:bodyPr>
+          <a:lstStyle/>
+          <a:p>
+            <a:r>
+              <a:rPr lang="en-US">
+                <a:latin typeface="Futura Medium" panose="020B0602020204020303" pitchFamily="34" charset="-79"/>
+                <a:cs typeface="Futura Medium" panose="020B0602020204020303" pitchFamily="34" charset="-79"/>
+              </a:rPr>
+              <a:t>Polygenic scores correlate with earnings-increasing </a:t>
+            </a:r>
+            <a:r>
+              <a:rPr lang="en-US">
+                <a:solidFill>
+                  <a:srgbClr val="4682B4"/>
+                </a:solidFill>
+                <a:latin typeface="Futura Medium" panose="020B0602020204020303" pitchFamily="34" charset="-79"/>
+                <a:cs typeface="Futura Medium" panose="020B0602020204020303" pitchFamily="34" charset="-79"/>
+              </a:rPr>
+              <a:t>human capital</a:t>
+            </a:r>
+            <a:r>
+              <a:rPr lang="en-US">
+                <a:latin typeface="Futura Medium" panose="020B0602020204020303" pitchFamily="34" charset="-79"/>
+                <a:cs typeface="Futura Medium" panose="020B0602020204020303" pitchFamily="34" charset="-79"/>
+              </a:rPr>
+              <a:t>. This has two effects on fertility…  </a:t>
+            </a:r>
+          </a:p>
+        </p:txBody>
+      </p:sp>
+      <p:sp>
+        <p:nvSpPr>
+          <p:cNvPr id="80" name="TextBox 79">
+            <a:extLst>
+              <a:ext uri="{FF2B5EF4-FFF2-40B4-BE49-F238E27FC236}">
+                <a16:creationId xmlns:a16="http://schemas.microsoft.com/office/drawing/2014/main" id="{A5A1543A-7280-BE48-BD9D-30C35C155D4D}"/>
+              </a:ext>
+            </a:extLst>
+          </p:cNvPr>
+          <p:cNvSpPr txBox="1"/>
+          <p:nvPr/>
+        </p:nvSpPr>
+        <p:spPr>
+          <a:xfrm>
+            <a:off x="18422157" y="22549515"/>
+            <a:ext cx="2654370" cy="1477328"/>
+          </a:xfrm>
+          <a:prstGeom prst="rect">
+            <a:avLst/>
+          </a:prstGeom>
+          <a:noFill/>
+        </p:spPr>
+        <p:txBody>
+          <a:bodyPr wrap="square" rtlCol="0">
+            <a:spAutoFit/>
+          </a:bodyPr>
+          <a:lstStyle/>
+          <a:p>
+            <a:pPr algn="r"/>
+            <a:r>
+              <a:rPr lang="en-US">
+                <a:latin typeface="Futura Medium" panose="020B0602020204020303" pitchFamily="34" charset="-79"/>
+                <a:cs typeface="Futura Medium" panose="020B0602020204020303" pitchFamily="34" charset="-79"/>
+              </a:rPr>
+              <a:t>… a fertility-decreasing </a:t>
+            </a:r>
+            <a:r>
+              <a:rPr lang="en-US">
+                <a:solidFill>
+                  <a:srgbClr val="FF0000"/>
+                </a:solidFill>
+                <a:latin typeface="Futura Medium" panose="020B0602020204020303" pitchFamily="34" charset="-79"/>
+                <a:cs typeface="Futura Medium" panose="020B0602020204020303" pitchFamily="34" charset="-79"/>
+              </a:rPr>
+              <a:t>substitution effect</a:t>
+            </a:r>
+            <a:r>
+              <a:rPr lang="en-US">
+                <a:latin typeface="Futura Medium" panose="020B0602020204020303" pitchFamily="34" charset="-79"/>
+                <a:cs typeface="Futura Medium" panose="020B0602020204020303" pitchFamily="34" charset="-79"/>
+              </a:rPr>
+              <a:t>: time spent on children has a higher cost in foregone earnings.</a:t>
+            </a:r>
+          </a:p>
+        </p:txBody>
+      </p:sp>
+      <p:sp>
+        <p:nvSpPr>
+          <p:cNvPr id="81" name="TextBox 80">
+            <a:extLst>
+              <a:ext uri="{FF2B5EF4-FFF2-40B4-BE49-F238E27FC236}">
+                <a16:creationId xmlns:a16="http://schemas.microsoft.com/office/drawing/2014/main" id="{940ECF61-961D-A55B-FBE4-C480037A72F7}"/>
+              </a:ext>
+            </a:extLst>
+          </p:cNvPr>
+          <p:cNvSpPr txBox="1"/>
+          <p:nvPr/>
+        </p:nvSpPr>
+        <p:spPr>
+          <a:xfrm>
+            <a:off x="14590314" y="22549515"/>
+            <a:ext cx="2529285" cy="1200329"/>
+          </a:xfrm>
+          <a:prstGeom prst="rect">
+            <a:avLst/>
+          </a:prstGeom>
+          <a:noFill/>
+        </p:spPr>
+        <p:txBody>
+          <a:bodyPr wrap="square" rtlCol="0">
+            <a:spAutoFit/>
+          </a:bodyPr>
+          <a:lstStyle/>
+          <a:p>
+            <a:r>
+              <a:rPr lang="en-US">
+                <a:latin typeface="Futura Medium" panose="020B0602020204020303" pitchFamily="34" charset="-79"/>
+                <a:cs typeface="Futura Medium" panose="020B0602020204020303" pitchFamily="34" charset="-79"/>
+              </a:rPr>
+              <a:t>… a fertility-increasing </a:t>
+            </a:r>
+            <a:r>
+              <a:rPr lang="en-US">
+                <a:solidFill>
+                  <a:srgbClr val="158D23"/>
+                </a:solidFill>
+                <a:latin typeface="Futura Medium" panose="020B0602020204020303" pitchFamily="34" charset="-79"/>
+                <a:cs typeface="Futura Medium" panose="020B0602020204020303" pitchFamily="34" charset="-79"/>
+              </a:rPr>
+              <a:t>income effect</a:t>
+            </a:r>
+            <a:r>
+              <a:rPr lang="en-US">
+                <a:latin typeface="Futura Medium" panose="020B0602020204020303" pitchFamily="34" charset="-79"/>
+                <a:cs typeface="Futura Medium" panose="020B0602020204020303" pitchFamily="34" charset="-79"/>
+              </a:rPr>
+              <a:t>: children become</a:t>
+            </a:r>
+            <a:br>
+              <a:rPr lang="en-US">
+                <a:latin typeface="Futura Medium" panose="020B0602020204020303" pitchFamily="34" charset="-79"/>
+                <a:cs typeface="Futura Medium" panose="020B0602020204020303" pitchFamily="34" charset="-79"/>
+              </a:rPr>
+            </a:br>
+            <a:r>
+              <a:rPr lang="en-US">
+                <a:latin typeface="Futura Medium" panose="020B0602020204020303" pitchFamily="34" charset="-79"/>
+                <a:cs typeface="Futura Medium" panose="020B0602020204020303" pitchFamily="34" charset="-79"/>
+              </a:rPr>
+              <a:t>more affordable.</a:t>
+            </a:r>
+          </a:p>
+        </p:txBody>
+      </p:sp>
+      <p:sp>
+        <p:nvSpPr>
+          <p:cNvPr id="83" name="TextBox 82">
+            <a:extLst>
+              <a:ext uri="{FF2B5EF4-FFF2-40B4-BE49-F238E27FC236}">
+                <a16:creationId xmlns:a16="http://schemas.microsoft.com/office/drawing/2014/main" id="{E0ADA0B5-448D-5A65-BBE0-A0C4A42D0221}"/>
+              </a:ext>
+            </a:extLst>
+          </p:cNvPr>
+          <p:cNvSpPr txBox="1"/>
+          <p:nvPr/>
+        </p:nvSpPr>
+        <p:spPr>
+          <a:xfrm>
+            <a:off x="14633575" y="26241806"/>
+            <a:ext cx="14048345" cy="1200329"/>
+          </a:xfrm>
+          <a:prstGeom prst="rect">
+            <a:avLst/>
+          </a:prstGeom>
+          <a:noFill/>
+        </p:spPr>
+        <p:txBody>
+          <a:bodyPr wrap="square" rtlCol="0">
+            <a:spAutoFit/>
+          </a:bodyPr>
+          <a:lstStyle/>
+          <a:p>
+            <a:r>
+              <a:rPr lang="en-US" sz="2400">
+                <a:latin typeface="Futura Medium" panose="020B0602020204020303" pitchFamily="34" charset="-79"/>
+                <a:cs typeface="Futura Medium" panose="020B0602020204020303" pitchFamily="34" charset="-79"/>
+              </a:rPr>
+              <a:t>This model can explain the patterns in our data, if the substitution effect is stronger at lower income levels. A mediation analysis shows that education significantly mediates the link between polygenic scores and fertility for 18/23 scores where there is a significant link.</a:t>
+            </a:r>
+          </a:p>
+        </p:txBody>
+      </p:sp>
       <p:pic>
         <p:nvPicPr>
-          <p:cNvPr id="1026" name="Graphic 1025">
+          <p:cNvPr id="1073" name="Graphic 1072">
             <a:extLst>
               <a:ext uri="{FF2B5EF4-FFF2-40B4-BE49-F238E27FC236}">
-                <a16:creationId xmlns:a16="http://schemas.microsoft.com/office/drawing/2014/main" id="{B6E4726C-C136-8927-9E32-907D1D9BEFBD}"/>
+                <a16:creationId xmlns:a16="http://schemas.microsoft.com/office/drawing/2014/main" id="{284842F1-FC75-1A57-C9C7-89BBF0D1231F}"/>
               </a:ext>
             </a:extLst>
           </p:cNvPr>
@@ -4474,475 +4691,7 @@
         </p:blipFill>
         <p:spPr>
           <a:xfrm>
-            <a:off x="14509850" y="24359592"/>
-            <a:ext cx="1011374" cy="1449133"/>
-          </a:xfrm>
-          <a:prstGeom prst="rect">
-            <a:avLst/>
-          </a:prstGeom>
-        </p:spPr>
-      </p:pic>
-      <p:pic>
-        <p:nvPicPr>
-          <p:cNvPr id="72" name="Graphic 71">
-            <a:extLst>
-              <a:ext uri="{FF2B5EF4-FFF2-40B4-BE49-F238E27FC236}">
-                <a16:creationId xmlns:a16="http://schemas.microsoft.com/office/drawing/2014/main" id="{A6081726-D906-87C4-3F3A-129B62F1F990}"/>
-              </a:ext>
-            </a:extLst>
-          </p:cNvPr>
-          <p:cNvPicPr>
-            <a:picLocks noChangeAspect="1"/>
-          </p:cNvPicPr>
-          <p:nvPr/>
-        </p:nvPicPr>
-        <p:blipFill>
-          <a:blip r:embed="rId15">
-            <a:extLst>
-              <a:ext uri="{96DAC541-7B7A-43D3-8B79-37D633B846F1}">
-                <asvg:svgBlip xmlns:asvg="http://schemas.microsoft.com/office/drawing/2016/SVG/main" r:embed="rId16"/>
-              </a:ext>
-            </a:extLst>
-          </a:blip>
-          <a:stretch>
-            <a:fillRect/>
-          </a:stretch>
-        </p:blipFill>
-        <p:spPr>
-          <a:xfrm>
-            <a:off x="15599517" y="24359592"/>
-            <a:ext cx="1011374" cy="1449133"/>
-          </a:xfrm>
-          <a:prstGeom prst="rect">
-            <a:avLst/>
-          </a:prstGeom>
-        </p:spPr>
-      </p:pic>
-      <p:pic>
-        <p:nvPicPr>
-          <p:cNvPr id="73" name="Graphic 72">
-            <a:extLst>
-              <a:ext uri="{FF2B5EF4-FFF2-40B4-BE49-F238E27FC236}">
-                <a16:creationId xmlns:a16="http://schemas.microsoft.com/office/drawing/2014/main" id="{E89956A7-B5F1-28AC-2639-5022874A8B53}"/>
-              </a:ext>
-            </a:extLst>
-          </p:cNvPr>
-          <p:cNvPicPr>
-            <a:picLocks noChangeAspect="1"/>
-          </p:cNvPicPr>
-          <p:nvPr/>
-        </p:nvPicPr>
-        <p:blipFill>
-          <a:blip r:embed="rId15">
-            <a:extLst>
-              <a:ext uri="{96DAC541-7B7A-43D3-8B79-37D633B846F1}">
-                <asvg:svgBlip xmlns:asvg="http://schemas.microsoft.com/office/drawing/2016/SVG/main" r:embed="rId16"/>
-              </a:ext>
-            </a:extLst>
-          </a:blip>
-          <a:stretch>
-            <a:fillRect/>
-          </a:stretch>
-        </p:blipFill>
-        <p:spPr>
-          <a:xfrm>
-            <a:off x="16668023" y="24359592"/>
-            <a:ext cx="1011374" cy="1449133"/>
-          </a:xfrm>
-          <a:prstGeom prst="rect">
-            <a:avLst/>
-          </a:prstGeom>
-        </p:spPr>
-      </p:pic>
-      <p:pic>
-        <p:nvPicPr>
-          <p:cNvPr id="74" name="Graphic 73">
-            <a:extLst>
-              <a:ext uri="{FF2B5EF4-FFF2-40B4-BE49-F238E27FC236}">
-                <a16:creationId xmlns:a16="http://schemas.microsoft.com/office/drawing/2014/main" id="{8EE2ABDA-197D-AF43-A2AB-8D836D6BCAB9}"/>
-              </a:ext>
-            </a:extLst>
-          </p:cNvPr>
-          <p:cNvPicPr>
-            <a:picLocks noChangeAspect="1"/>
-          </p:cNvPicPr>
-          <p:nvPr/>
-        </p:nvPicPr>
-        <p:blipFill>
-          <a:blip r:embed="rId17">
-            <a:extLst>
-              <a:ext uri="{96DAC541-7B7A-43D3-8B79-37D633B846F1}">
-                <asvg:svgBlip xmlns:asvg="http://schemas.microsoft.com/office/drawing/2016/SVG/main" r:embed="rId18"/>
-              </a:ext>
-            </a:extLst>
-          </a:blip>
-          <a:stretch>
-            <a:fillRect/>
-          </a:stretch>
-        </p:blipFill>
-        <p:spPr>
-          <a:xfrm>
-            <a:off x="18072345" y="24359592"/>
-            <a:ext cx="998207" cy="1430267"/>
-          </a:xfrm>
-          <a:prstGeom prst="rect">
-            <a:avLst/>
-          </a:prstGeom>
-        </p:spPr>
-      </p:pic>
-      <p:pic>
-        <p:nvPicPr>
-          <p:cNvPr id="75" name="Graphic 74">
-            <a:extLst>
-              <a:ext uri="{FF2B5EF4-FFF2-40B4-BE49-F238E27FC236}">
-                <a16:creationId xmlns:a16="http://schemas.microsoft.com/office/drawing/2014/main" id="{CB66EAFD-A74D-4F03-D610-B2EE82CBC419}"/>
-              </a:ext>
-            </a:extLst>
-          </p:cNvPr>
-          <p:cNvPicPr>
-            <a:picLocks noChangeAspect="1"/>
-          </p:cNvPicPr>
-          <p:nvPr/>
-        </p:nvPicPr>
-        <p:blipFill>
-          <a:blip r:embed="rId17">
-            <a:extLst>
-              <a:ext uri="{96DAC541-7B7A-43D3-8B79-37D633B846F1}">
-                <asvg:svgBlip xmlns:asvg="http://schemas.microsoft.com/office/drawing/2016/SVG/main" r:embed="rId18"/>
-              </a:ext>
-            </a:extLst>
-          </a:blip>
-          <a:stretch>
-            <a:fillRect/>
-          </a:stretch>
-        </p:blipFill>
-        <p:spPr>
-          <a:xfrm>
-            <a:off x="19160862" y="24359592"/>
-            <a:ext cx="998207" cy="1430267"/>
-          </a:xfrm>
-          <a:prstGeom prst="rect">
-            <a:avLst/>
-          </a:prstGeom>
-        </p:spPr>
-      </p:pic>
-      <p:sp>
-        <p:nvSpPr>
-          <p:cNvPr id="1028" name="TextBox 1027">
-            <a:extLst>
-              <a:ext uri="{FF2B5EF4-FFF2-40B4-BE49-F238E27FC236}">
-                <a16:creationId xmlns:a16="http://schemas.microsoft.com/office/drawing/2014/main" id="{AAE27DA6-D338-4D25-9BAC-45FCFFDD5D6C}"/>
-              </a:ext>
-            </a:extLst>
-          </p:cNvPr>
-          <p:cNvSpPr txBox="1"/>
-          <p:nvPr/>
-        </p:nvSpPr>
-        <p:spPr>
-          <a:xfrm>
-            <a:off x="19376844" y="24846609"/>
-            <a:ext cx="557580" cy="584775"/>
-          </a:xfrm>
-          <a:prstGeom prst="rect">
-            <a:avLst/>
-          </a:prstGeom>
-          <a:noFill/>
-        </p:spPr>
-        <p:txBody>
-          <a:bodyPr wrap="square" rtlCol="0">
-            <a:spAutoFit/>
-          </a:bodyPr>
-          <a:lstStyle/>
-          <a:p>
-            <a:pPr algn="ctr"/>
-            <a:r>
-              <a:rPr lang="en-US" sz="3200" b="1">
-                <a:solidFill>
-                  <a:schemeClr val="bg1"/>
-                </a:solidFill>
-              </a:rPr>
-              <a:t>–</a:t>
-            </a:r>
-          </a:p>
-        </p:txBody>
-      </p:sp>
-      <p:sp>
-        <p:nvSpPr>
-          <p:cNvPr id="78" name="TextBox 77">
-            <a:extLst>
-              <a:ext uri="{FF2B5EF4-FFF2-40B4-BE49-F238E27FC236}">
-                <a16:creationId xmlns:a16="http://schemas.microsoft.com/office/drawing/2014/main" id="{45CBF61D-634B-B827-ADB2-D1DC7EA91C23}"/>
-              </a:ext>
-            </a:extLst>
-          </p:cNvPr>
-          <p:cNvSpPr txBox="1"/>
-          <p:nvPr/>
-        </p:nvSpPr>
-        <p:spPr>
-          <a:xfrm>
-            <a:off x="16757693" y="24846609"/>
-            <a:ext cx="876288" cy="584775"/>
-          </a:xfrm>
-          <a:prstGeom prst="rect">
-            <a:avLst/>
-          </a:prstGeom>
-          <a:noFill/>
-        </p:spPr>
-        <p:txBody>
-          <a:bodyPr wrap="square" rtlCol="0">
-            <a:spAutoFit/>
-          </a:bodyPr>
-          <a:lstStyle/>
-          <a:p>
-            <a:pPr algn="ctr"/>
-            <a:r>
-              <a:rPr lang="en-US" sz="3200" b="1">
-                <a:solidFill>
-                  <a:schemeClr val="bg1"/>
-                </a:solidFill>
-              </a:rPr>
-              <a:t>+</a:t>
-            </a:r>
-          </a:p>
-        </p:txBody>
-      </p:sp>
-      <p:sp>
-        <p:nvSpPr>
-          <p:cNvPr id="1030" name="TextBox 1029">
-            <a:extLst>
-              <a:ext uri="{FF2B5EF4-FFF2-40B4-BE49-F238E27FC236}">
-                <a16:creationId xmlns:a16="http://schemas.microsoft.com/office/drawing/2014/main" id="{0F51016D-E099-1736-D48F-1D0CF34CBD79}"/>
-              </a:ext>
-            </a:extLst>
-          </p:cNvPr>
-          <p:cNvSpPr txBox="1"/>
-          <p:nvPr/>
-        </p:nvSpPr>
-        <p:spPr>
-          <a:xfrm>
-            <a:off x="18423210" y="20618478"/>
-            <a:ext cx="2654370" cy="1477328"/>
-          </a:xfrm>
-          <a:prstGeom prst="rect">
-            <a:avLst/>
-          </a:prstGeom>
-          <a:noFill/>
-        </p:spPr>
-        <p:txBody>
-          <a:bodyPr wrap="square" rtlCol="0">
-            <a:spAutoFit/>
-          </a:bodyPr>
-          <a:lstStyle/>
-          <a:p>
-            <a:r>
-              <a:rPr lang="en-US">
-                <a:latin typeface="Futura Medium" panose="020B0602020204020303" pitchFamily="34" charset="-79"/>
-                <a:cs typeface="Futura Medium" panose="020B0602020204020303" pitchFamily="34" charset="-79"/>
-              </a:rPr>
-              <a:t>Polygenic scores correlate with earnings-increasing </a:t>
-            </a:r>
-            <a:r>
-              <a:rPr lang="en-US" b="1">
-                <a:latin typeface="FUTURA MEDIUM" panose="020B0602020204020303" pitchFamily="34" charset="-79"/>
-                <a:cs typeface="FUTURA MEDIUM" panose="020B0602020204020303" pitchFamily="34" charset="-79"/>
-              </a:rPr>
-              <a:t>human capital</a:t>
-            </a:r>
-            <a:r>
-              <a:rPr lang="en-US">
-                <a:latin typeface="Futura Medium" panose="020B0602020204020303" pitchFamily="34" charset="-79"/>
-                <a:cs typeface="Futura Medium" panose="020B0602020204020303" pitchFamily="34" charset="-79"/>
-              </a:rPr>
-              <a:t>. This has two effects on fertility…  </a:t>
-            </a:r>
-          </a:p>
-        </p:txBody>
-      </p:sp>
-      <p:sp>
-        <p:nvSpPr>
-          <p:cNvPr id="80" name="TextBox 79">
-            <a:extLst>
-              <a:ext uri="{FF2B5EF4-FFF2-40B4-BE49-F238E27FC236}">
-                <a16:creationId xmlns:a16="http://schemas.microsoft.com/office/drawing/2014/main" id="{A5A1543A-7280-BE48-BD9D-30C35C155D4D}"/>
-              </a:ext>
-            </a:extLst>
-          </p:cNvPr>
-          <p:cNvSpPr txBox="1"/>
-          <p:nvPr/>
-        </p:nvSpPr>
-        <p:spPr>
-          <a:xfrm>
-            <a:off x="18422157" y="22549515"/>
-            <a:ext cx="2654370" cy="1200329"/>
-          </a:xfrm>
-          <a:prstGeom prst="rect">
-            <a:avLst/>
-          </a:prstGeom>
-          <a:noFill/>
-        </p:spPr>
-        <p:txBody>
-          <a:bodyPr wrap="square" rtlCol="0">
-            <a:spAutoFit/>
-          </a:bodyPr>
-          <a:lstStyle/>
-          <a:p>
-            <a:pPr algn="r"/>
-            <a:r>
-              <a:rPr lang="en-US">
-                <a:latin typeface="Futura Medium" panose="020B0602020204020303" pitchFamily="34" charset="-79"/>
-                <a:cs typeface="Futura Medium" panose="020B0602020204020303" pitchFamily="34" charset="-79"/>
-              </a:rPr>
-              <a:t>… a fertility-decreasing </a:t>
-            </a:r>
-            <a:r>
-              <a:rPr lang="en-US" b="1">
-                <a:latin typeface="FUTURA MEDIUM" panose="020B0602020204020303" pitchFamily="34" charset="-79"/>
-                <a:cs typeface="FUTURA MEDIUM" panose="020B0602020204020303" pitchFamily="34" charset="-79"/>
-              </a:rPr>
-              <a:t>substitution effect</a:t>
-            </a:r>
-            <a:r>
-              <a:rPr lang="en-US">
-                <a:latin typeface="Futura Medium" panose="020B0602020204020303" pitchFamily="34" charset="-79"/>
-                <a:cs typeface="Futura Medium" panose="020B0602020204020303" pitchFamily="34" charset="-79"/>
-              </a:rPr>
-              <a:t>: time spent on children has a higher opportunity cost.</a:t>
-            </a:r>
-          </a:p>
-        </p:txBody>
-      </p:sp>
-      <p:sp>
-        <p:nvSpPr>
-          <p:cNvPr id="81" name="TextBox 80">
-            <a:extLst>
-              <a:ext uri="{FF2B5EF4-FFF2-40B4-BE49-F238E27FC236}">
-                <a16:creationId xmlns:a16="http://schemas.microsoft.com/office/drawing/2014/main" id="{940ECF61-961D-A55B-FBE4-C480037A72F7}"/>
-              </a:ext>
-            </a:extLst>
-          </p:cNvPr>
-          <p:cNvSpPr txBox="1"/>
-          <p:nvPr/>
-        </p:nvSpPr>
-        <p:spPr>
-          <a:xfrm>
-            <a:off x="14590314" y="22549515"/>
-            <a:ext cx="2529285" cy="1200329"/>
-          </a:xfrm>
-          <a:prstGeom prst="rect">
-            <a:avLst/>
-          </a:prstGeom>
-          <a:noFill/>
-        </p:spPr>
-        <p:txBody>
-          <a:bodyPr wrap="square" rtlCol="0">
-            <a:spAutoFit/>
-          </a:bodyPr>
-          <a:lstStyle/>
-          <a:p>
-            <a:r>
-              <a:rPr lang="en-US">
-                <a:latin typeface="Futura Medium" panose="020B0602020204020303" pitchFamily="34" charset="-79"/>
-                <a:cs typeface="Futura Medium" panose="020B0602020204020303" pitchFamily="34" charset="-79"/>
-              </a:rPr>
-              <a:t>… a fertility-increasing </a:t>
-            </a:r>
-            <a:r>
-              <a:rPr lang="en-US" b="1">
-                <a:latin typeface="FUTURA MEDIUM" panose="020B0602020204020303" pitchFamily="34" charset="-79"/>
-                <a:cs typeface="FUTURA MEDIUM" panose="020B0602020204020303" pitchFamily="34" charset="-79"/>
-              </a:rPr>
-              <a:t>income effect</a:t>
-            </a:r>
-            <a:r>
-              <a:rPr lang="en-US">
-                <a:latin typeface="Futura Medium" panose="020B0602020204020303" pitchFamily="34" charset="-79"/>
-                <a:cs typeface="Futura Medium" panose="020B0602020204020303" pitchFamily="34" charset="-79"/>
-              </a:rPr>
-              <a:t>: children become</a:t>
-            </a:r>
-            <a:br>
-              <a:rPr lang="en-US">
-                <a:latin typeface="Futura Medium" panose="020B0602020204020303" pitchFamily="34" charset="-79"/>
-                <a:cs typeface="Futura Medium" panose="020B0602020204020303" pitchFamily="34" charset="-79"/>
-              </a:rPr>
-            </a:br>
-            <a:r>
-              <a:rPr lang="en-US">
-                <a:latin typeface="Futura Medium" panose="020B0602020204020303" pitchFamily="34" charset="-79"/>
-                <a:cs typeface="Futura Medium" panose="020B0602020204020303" pitchFamily="34" charset="-79"/>
-              </a:rPr>
-              <a:t>more affordable.</a:t>
-            </a:r>
-          </a:p>
-        </p:txBody>
-      </p:sp>
-      <p:sp>
-        <p:nvSpPr>
-          <p:cNvPr id="83" name="TextBox 82">
-            <a:extLst>
-              <a:ext uri="{FF2B5EF4-FFF2-40B4-BE49-F238E27FC236}">
-                <a16:creationId xmlns:a16="http://schemas.microsoft.com/office/drawing/2014/main" id="{E0ADA0B5-448D-5A65-BBE0-A0C4A42D0221}"/>
-              </a:ext>
-            </a:extLst>
-          </p:cNvPr>
-          <p:cNvSpPr txBox="1"/>
-          <p:nvPr/>
-        </p:nvSpPr>
-        <p:spPr>
-          <a:xfrm>
-            <a:off x="14633575" y="26241806"/>
-            <a:ext cx="14048345" cy="1200329"/>
-          </a:xfrm>
-          <a:prstGeom prst="rect">
-            <a:avLst/>
-          </a:prstGeom>
-          <a:noFill/>
-        </p:spPr>
-        <p:txBody>
-          <a:bodyPr wrap="square" rtlCol="0">
-            <a:spAutoFit/>
-          </a:bodyPr>
-          <a:lstStyle/>
-          <a:p>
-            <a:r>
-              <a:rPr lang="en-US" sz="2400">
-                <a:latin typeface="Futura Medium" panose="020B0602020204020303" pitchFamily="34" charset="-79"/>
-                <a:cs typeface="Futura Medium" panose="020B0602020204020303" pitchFamily="34" charset="-79"/>
-              </a:rPr>
-              <a:t>This model can explain the patterns in our data, if the substitution effect is stronger at lower income levels. A mediation analysis shows that education significantly mediates the link between polygenic scores and fertility for 18/23 scores where there is a significant link.</a:t>
-            </a:r>
-          </a:p>
-        </p:txBody>
-      </p:sp>
-      <p:pic>
-        <p:nvPicPr>
-          <p:cNvPr id="1073" name="Graphic 1072">
-            <a:extLst>
-              <a:ext uri="{FF2B5EF4-FFF2-40B4-BE49-F238E27FC236}">
-                <a16:creationId xmlns:a16="http://schemas.microsoft.com/office/drawing/2014/main" id="{284842F1-FC75-1A57-C9C7-89BBF0D1231F}"/>
-              </a:ext>
-            </a:extLst>
-          </p:cNvPr>
-          <p:cNvPicPr>
-            <a:picLocks noChangeAspect="1"/>
-          </p:cNvPicPr>
-          <p:nvPr/>
-        </p:nvPicPr>
-        <p:blipFill>
-          <a:blip r:embed="rId19">
-            <a:extLst>
-              <a:ext uri="{96DAC541-7B7A-43D3-8B79-37D633B846F1}">
-                <asvg:svgBlip xmlns:asvg="http://schemas.microsoft.com/office/drawing/2016/SVG/main" r:embed="rId20"/>
-              </a:ext>
-            </a:extLst>
-          </a:blip>
-          <a:stretch>
-            <a:fillRect/>
-          </a:stretch>
-        </p:blipFill>
-        <p:spPr>
-          <a:xfrm>
-            <a:off x="14516896" y="20774226"/>
+            <a:off x="14645222" y="20820058"/>
             <a:ext cx="1085390" cy="1432715"/>
           </a:xfrm>
           <a:prstGeom prst="rect">
@@ -4964,8 +4713,8 @@
         </p:nvSpPr>
         <p:spPr>
           <a:xfrm>
-            <a:off x="14590315" y="32193203"/>
-            <a:ext cx="4202663" cy="5262979"/>
+            <a:off x="14590316" y="32193203"/>
+            <a:ext cx="3831842" cy="5722079"/>
           </a:xfrm>
           <a:prstGeom prst="rect">
             <a:avLst/>
@@ -4983,7 +4732,24 @@
                 <a:latin typeface="Futura Medium" panose="020B0602020204020303" pitchFamily="34" charset="-79"/>
                 <a:cs typeface="Futura Medium" panose="020B0602020204020303" pitchFamily="34" charset="-79"/>
               </a:rPr>
-              <a:t>Selection against earnings-increasing variants is stronger at lower incomes. This increases inequality between income groups, and the unfairness of the “genetic lottery” (Harden 2021). Natural selection i</a:t>
+              <a:t>Selection against earnings-increasing variants is stronger at lower incomes. This increases inequality between income groups, and the unfairness of the </a:t>
+            </a:r>
+            <a:r>
+              <a:rPr lang="en-US" sz="2400">
+                <a:solidFill>
+                  <a:srgbClr val="4682B4"/>
+                </a:solidFill>
+                <a:latin typeface="Futura Medium" panose="020B0602020204020303" pitchFamily="34" charset="-79"/>
+                <a:cs typeface="Futura Medium" panose="020B0602020204020303" pitchFamily="34" charset="-79"/>
+              </a:rPr>
+              <a:t>genetic lottery</a:t>
+            </a:r>
+            <a:r>
+              <a:rPr lang="en-US" sz="2400">
+                <a:latin typeface="Futura Medium" panose="020B0602020204020303" pitchFamily="34" charset="-79"/>
+                <a:cs typeface="Futura Medium" panose="020B0602020204020303" pitchFamily="34" charset="-79"/>
+              </a:rPr>
+              <a:t> (Harden 2021). Natural selection i</a:t>
             </a:r>
             <a:r>
               <a:rPr lang="en-GB" sz="2400">
@@ -5021,7 +4787,7 @@
           <p:nvPr/>
         </p:nvPicPr>
         <p:blipFill>
-          <a:blip r:embed="rId21">
+          <a:blip r:embed="rId17">
             <a:extLst>
               <a:ext uri="{28A0092B-C50C-407E-A947-70E740481C1C}">
                 <a14:useLocalDpi xmlns:a14="http://schemas.microsoft.com/office/drawing/2010/main" val="0"/>
@@ -5068,7 +4834,7 @@
           <p:nvPr/>
         </p:nvPicPr>
         <p:blipFill>
-          <a:blip r:embed="rId21">
+          <a:blip r:embed="rId17">
             <a:extLst>
               <a:ext uri="{28A0092B-C50C-407E-A947-70E740481C1C}">
                 <a14:useLocalDpi xmlns:a14="http://schemas.microsoft.com/office/drawing/2010/main" val="0"/>
@@ -5082,7 +4848,7 @@
         </p:blipFill>
         <p:spPr bwMode="auto">
           <a:xfrm>
-            <a:off x="17696858" y="6789186"/>
+            <a:off x="17569858" y="6814586"/>
             <a:ext cx="595182" cy="489571"/>
           </a:xfrm>
           <a:prstGeom prst="rect">
@@ -5114,8 +4880,8 @@
         </p:nvSpPr>
         <p:spPr>
           <a:xfrm>
-            <a:off x="14619007" y="39092600"/>
-            <a:ext cx="14048344" cy="2308324"/>
+            <a:off x="18161000" y="38533800"/>
+            <a:ext cx="10421816" cy="3046988"/>
           </a:xfrm>
           <a:prstGeom prst="rect">
             <a:avLst/>
@@ -5172,9 +4938,18 @@
             </a:r>
             <a:r>
               <a:rPr lang="en-GB" sz="2400">
+                <a:solidFill>
+                  <a:srgbClr val="4682B4"/>
+                </a:solidFill>
                 <a:latin typeface="Futura Medium" panose="020B0602020204020303" pitchFamily="34" charset="-79"/>
                 <a:cs typeface="Futura Medium" panose="020B0602020204020303" pitchFamily="34" charset="-79"/>
-                <a:hlinkClick r:id="rId22"/>
+                <a:hlinkClick r:id="rId18">
+                  <a:extLst>
+                    <a:ext uri="{A12FA001-AC4F-418D-AE19-62706E023703}">
+                      <ahyp:hlinkClr xmlns:ahyp="http://schemas.microsoft.com/office/drawing/2018/hyperlinkcolor" val="tx"/>
+                    </a:ext>
+                  </a:extLst>
+                </a:hlinkClick>
               </a:rPr>
               <a:t>https://github.com/hughjonesd/why-natural-selection</a:t>
             </a:r>
@@ -5193,6 +4968,651 @@
           </a:p>
         </p:txBody>
       </p:sp>
+      <p:grpSp>
+        <p:nvGrpSpPr>
+          <p:cNvPr id="13" name="Group 12">
+            <a:extLst>
+              <a:ext uri="{FF2B5EF4-FFF2-40B4-BE49-F238E27FC236}">
+                <a16:creationId xmlns:a16="http://schemas.microsoft.com/office/drawing/2014/main" id="{ADB59F21-0FD3-C007-2C13-EEBA3383EAED}"/>
+              </a:ext>
+            </a:extLst>
+          </p:cNvPr>
+          <p:cNvGrpSpPr/>
+          <p:nvPr/>
+        </p:nvGrpSpPr>
+        <p:grpSpPr>
+          <a:xfrm>
+            <a:off x="15961022" y="24359592"/>
+            <a:ext cx="1011374" cy="1449133"/>
+            <a:chOff x="15599517" y="24359592"/>
+            <a:chExt cx="1011374" cy="1449133"/>
+          </a:xfrm>
+        </p:grpSpPr>
+        <p:pic>
+          <p:nvPicPr>
+            <p:cNvPr id="72" name="Graphic 71">
+              <a:extLst>
+                <a:ext uri="{FF2B5EF4-FFF2-40B4-BE49-F238E27FC236}">
+                  <a16:creationId xmlns:a16="http://schemas.microsoft.com/office/drawing/2014/main" id="{A6081726-D906-87C4-3F3A-129B62F1F990}"/>
+                </a:ext>
+              </a:extLst>
+            </p:cNvPr>
+            <p:cNvPicPr>
+              <a:picLocks noChangeAspect="1"/>
+            </p:cNvPicPr>
+            <p:nvPr/>
+          </p:nvPicPr>
+          <p:blipFill>
+            <a:blip r:embed="rId19">
+              <a:extLst>
+                <a:ext uri="{96DAC541-7B7A-43D3-8B79-37D633B846F1}">
+                  <asvg:svgBlip xmlns:asvg="http://schemas.microsoft.com/office/drawing/2016/SVG/main" r:embed="rId20"/>
+                </a:ext>
+              </a:extLst>
+            </a:blip>
+            <a:stretch>
+              <a:fillRect/>
+            </a:stretch>
+          </p:blipFill>
+          <p:spPr>
+            <a:xfrm>
+              <a:off x="15599517" y="24359592"/>
+              <a:ext cx="1011374" cy="1449133"/>
+            </a:xfrm>
+            <a:prstGeom prst="rect">
+              <a:avLst/>
+            </a:prstGeom>
+          </p:spPr>
+        </p:pic>
+        <p:sp>
+          <p:nvSpPr>
+            <p:cNvPr id="2" name="Cross 1">
+              <a:extLst>
+                <a:ext uri="{FF2B5EF4-FFF2-40B4-BE49-F238E27FC236}">
+                  <a16:creationId xmlns:a16="http://schemas.microsoft.com/office/drawing/2014/main" id="{C92D0D77-07C9-5F13-1318-49A62B1D81AB}"/>
+                </a:ext>
+              </a:extLst>
+            </p:cNvPr>
+            <p:cNvSpPr/>
+            <p:nvPr/>
+          </p:nvSpPr>
+          <p:spPr>
+            <a:xfrm>
+              <a:off x="15982048" y="25001356"/>
+              <a:ext cx="246494" cy="258170"/>
+            </a:xfrm>
+            <a:prstGeom prst="plus">
+              <a:avLst>
+                <a:gd name="adj" fmla="val 39286"/>
+              </a:avLst>
+            </a:prstGeom>
+            <a:solidFill>
+              <a:schemeClr val="bg1"/>
+            </a:solidFill>
+            <a:ln>
+              <a:noFill/>
+            </a:ln>
+          </p:spPr>
+          <p:style>
+            <a:lnRef idx="2">
+              <a:schemeClr val="accent1">
+                <a:shade val="50000"/>
+              </a:schemeClr>
+            </a:lnRef>
+            <a:fillRef idx="1">
+              <a:schemeClr val="accent1"/>
+            </a:fillRef>
+            <a:effectRef idx="0">
+              <a:schemeClr val="accent1"/>
+            </a:effectRef>
+            <a:fontRef idx="minor">
+              <a:schemeClr val="lt1"/>
+            </a:fontRef>
+          </p:style>
+          <p:txBody>
+            <a:bodyPr rtlCol="0" anchor="ctr"/>
+            <a:lstStyle/>
+            <a:p>
+              <a:pPr algn="ctr"/>
+              <a:endParaRPr lang="en-US"/>
+            </a:p>
+          </p:txBody>
+        </p:sp>
+      </p:grpSp>
+      <p:grpSp>
+        <p:nvGrpSpPr>
+          <p:cNvPr id="8" name="Group 7">
+            <a:extLst>
+              <a:ext uri="{FF2B5EF4-FFF2-40B4-BE49-F238E27FC236}">
+                <a16:creationId xmlns:a16="http://schemas.microsoft.com/office/drawing/2014/main" id="{4F1890C8-55BA-56C2-86DA-BB8AB8DB5AA7}"/>
+              </a:ext>
+            </a:extLst>
+          </p:cNvPr>
+          <p:cNvGrpSpPr/>
+          <p:nvPr/>
+        </p:nvGrpSpPr>
+        <p:grpSpPr>
+          <a:xfrm>
+            <a:off x="14918467" y="24356129"/>
+            <a:ext cx="1011374" cy="1449133"/>
+            <a:chOff x="14556962" y="24356129"/>
+            <a:chExt cx="1011374" cy="1449133"/>
+          </a:xfrm>
+        </p:grpSpPr>
+        <p:pic>
+          <p:nvPicPr>
+            <p:cNvPr id="43" name="Graphic 42">
+              <a:extLst>
+                <a:ext uri="{FF2B5EF4-FFF2-40B4-BE49-F238E27FC236}">
+                  <a16:creationId xmlns:a16="http://schemas.microsoft.com/office/drawing/2014/main" id="{C516FB80-4181-2F4A-63FE-B018C1322F18}"/>
+                </a:ext>
+              </a:extLst>
+            </p:cNvPr>
+            <p:cNvPicPr>
+              <a:picLocks noChangeAspect="1"/>
+            </p:cNvPicPr>
+            <p:nvPr/>
+          </p:nvPicPr>
+          <p:blipFill>
+            <a:blip r:embed="rId19">
+              <a:extLst>
+                <a:ext uri="{96DAC541-7B7A-43D3-8B79-37D633B846F1}">
+                  <asvg:svgBlip xmlns:asvg="http://schemas.microsoft.com/office/drawing/2016/SVG/main" r:embed="rId20"/>
+                </a:ext>
+              </a:extLst>
+            </a:blip>
+            <a:stretch>
+              <a:fillRect/>
+            </a:stretch>
+          </p:blipFill>
+          <p:spPr>
+            <a:xfrm>
+              <a:off x="14556962" y="24356129"/>
+              <a:ext cx="1011374" cy="1449133"/>
+            </a:xfrm>
+            <a:prstGeom prst="rect">
+              <a:avLst/>
+            </a:prstGeom>
+          </p:spPr>
+        </p:pic>
+        <p:sp>
+          <p:nvSpPr>
+            <p:cNvPr id="45" name="Cross 44">
+              <a:extLst>
+                <a:ext uri="{FF2B5EF4-FFF2-40B4-BE49-F238E27FC236}">
+                  <a16:creationId xmlns:a16="http://schemas.microsoft.com/office/drawing/2014/main" id="{6BF90694-F7DB-1224-5D00-D60DD71FE3B7}"/>
+                </a:ext>
+              </a:extLst>
+            </p:cNvPr>
+            <p:cNvSpPr/>
+            <p:nvPr/>
+          </p:nvSpPr>
+          <p:spPr>
+            <a:xfrm>
+              <a:off x="14939493" y="24997893"/>
+              <a:ext cx="246494" cy="258170"/>
+            </a:xfrm>
+            <a:prstGeom prst="plus">
+              <a:avLst>
+                <a:gd name="adj" fmla="val 39286"/>
+              </a:avLst>
+            </a:prstGeom>
+            <a:solidFill>
+              <a:schemeClr val="bg1"/>
+            </a:solidFill>
+            <a:ln>
+              <a:noFill/>
+            </a:ln>
+          </p:spPr>
+          <p:style>
+            <a:lnRef idx="2">
+              <a:schemeClr val="accent1">
+                <a:shade val="50000"/>
+              </a:schemeClr>
+            </a:lnRef>
+            <a:fillRef idx="1">
+              <a:schemeClr val="accent1"/>
+            </a:fillRef>
+            <a:effectRef idx="0">
+              <a:schemeClr val="accent1"/>
+            </a:effectRef>
+            <a:fontRef idx="minor">
+              <a:schemeClr val="lt1"/>
+            </a:fontRef>
+          </p:style>
+          <p:txBody>
+            <a:bodyPr rtlCol="0" anchor="ctr"/>
+            <a:lstStyle/>
+            <a:p>
+              <a:pPr algn="ctr"/>
+              <a:endParaRPr lang="en-US"/>
+            </a:p>
+          </p:txBody>
+        </p:sp>
+      </p:grpSp>
+      <p:sp>
+        <p:nvSpPr>
+          <p:cNvPr id="50" name="Cross 49">
+            <a:extLst>
+              <a:ext uri="{FF2B5EF4-FFF2-40B4-BE49-F238E27FC236}">
+                <a16:creationId xmlns:a16="http://schemas.microsoft.com/office/drawing/2014/main" id="{2143ADA7-D131-98F6-FF6C-92B857F52ADA}"/>
+              </a:ext>
+            </a:extLst>
+          </p:cNvPr>
+          <p:cNvSpPr/>
+          <p:nvPr/>
+        </p:nvSpPr>
+        <p:spPr>
+          <a:xfrm>
+            <a:off x="17038457" y="24997892"/>
+            <a:ext cx="246494" cy="258170"/>
+          </a:xfrm>
+          <a:prstGeom prst="plus">
+            <a:avLst>
+              <a:gd name="adj" fmla="val 39286"/>
+            </a:avLst>
+          </a:prstGeom>
+          <a:solidFill>
+            <a:schemeClr val="bg1"/>
+          </a:solidFill>
+          <a:ln>
+            <a:noFill/>
+          </a:ln>
+        </p:spPr>
+        <p:style>
+          <a:lnRef idx="2">
+            <a:schemeClr val="accent1">
+              <a:shade val="50000"/>
+            </a:schemeClr>
+          </a:lnRef>
+          <a:fillRef idx="1">
+            <a:schemeClr val="accent1"/>
+          </a:fillRef>
+          <a:effectRef idx="0">
+            <a:schemeClr val="accent1"/>
+          </a:effectRef>
+          <a:fontRef idx="minor">
+            <a:schemeClr val="lt1"/>
+          </a:fontRef>
+        </p:style>
+        <p:txBody>
+          <a:bodyPr rtlCol="0" anchor="ctr"/>
+          <a:lstStyle/>
+          <a:p>
+            <a:pPr algn="ctr"/>
+            <a:endParaRPr lang="en-US"/>
+          </a:p>
+        </p:txBody>
+      </p:sp>
+      <p:grpSp>
+        <p:nvGrpSpPr>
+          <p:cNvPr id="12" name="Group 11">
+            <a:extLst>
+              <a:ext uri="{FF2B5EF4-FFF2-40B4-BE49-F238E27FC236}">
+                <a16:creationId xmlns:a16="http://schemas.microsoft.com/office/drawing/2014/main" id="{846B2148-42B2-2BBA-6F3C-513AAF08D313}"/>
+              </a:ext>
+            </a:extLst>
+          </p:cNvPr>
+          <p:cNvGrpSpPr/>
+          <p:nvPr/>
+        </p:nvGrpSpPr>
+        <p:grpSpPr>
+          <a:xfrm>
+            <a:off x="18603970" y="24359592"/>
+            <a:ext cx="998207" cy="1430267"/>
+            <a:chOff x="18072345" y="24359592"/>
+            <a:chExt cx="998207" cy="1430267"/>
+          </a:xfrm>
+        </p:grpSpPr>
+        <p:pic>
+          <p:nvPicPr>
+            <p:cNvPr id="74" name="Graphic 73">
+              <a:extLst>
+                <a:ext uri="{FF2B5EF4-FFF2-40B4-BE49-F238E27FC236}">
+                  <a16:creationId xmlns:a16="http://schemas.microsoft.com/office/drawing/2014/main" id="{8EE2ABDA-197D-AF43-A2AB-8D836D6BCAB9}"/>
+                </a:ext>
+              </a:extLst>
+            </p:cNvPr>
+            <p:cNvPicPr>
+              <a:picLocks noChangeAspect="1"/>
+            </p:cNvPicPr>
+            <p:nvPr/>
+          </p:nvPicPr>
+          <p:blipFill>
+            <a:blip r:embed="rId21">
+              <a:extLst>
+                <a:ext uri="{96DAC541-7B7A-43D3-8B79-37D633B846F1}">
+                  <asvg:svgBlip xmlns:asvg="http://schemas.microsoft.com/office/drawing/2016/SVG/main" r:embed="rId22"/>
+                </a:ext>
+              </a:extLst>
+            </a:blip>
+            <a:stretch>
+              <a:fillRect/>
+            </a:stretch>
+          </p:blipFill>
+          <p:spPr>
+            <a:xfrm>
+              <a:off x="18072345" y="24359592"/>
+              <a:ext cx="998207" cy="1430267"/>
+            </a:xfrm>
+            <a:prstGeom prst="rect">
+              <a:avLst/>
+            </a:prstGeom>
+          </p:spPr>
+        </p:pic>
+        <p:sp>
+          <p:nvSpPr>
+            <p:cNvPr id="11" name="Rectangle 10">
+              <a:extLst>
+                <a:ext uri="{FF2B5EF4-FFF2-40B4-BE49-F238E27FC236}">
+                  <a16:creationId xmlns:a16="http://schemas.microsoft.com/office/drawing/2014/main" id="{8B2F5A8B-6F4D-E843-5AD9-24BE49A28F05}"/>
+                </a:ext>
+              </a:extLst>
+            </p:cNvPr>
+            <p:cNvSpPr/>
+            <p:nvPr/>
+          </p:nvSpPr>
+          <p:spPr>
+            <a:xfrm>
+              <a:off x="18464645" y="25094045"/>
+              <a:ext cx="207819" cy="62346"/>
+            </a:xfrm>
+            <a:prstGeom prst="rect">
+              <a:avLst/>
+            </a:prstGeom>
+            <a:solidFill>
+              <a:schemeClr val="bg1"/>
+            </a:solidFill>
+            <a:ln>
+              <a:solidFill>
+                <a:schemeClr val="bg1"/>
+              </a:solidFill>
+            </a:ln>
+          </p:spPr>
+          <p:style>
+            <a:lnRef idx="2">
+              <a:schemeClr val="accent1">
+                <a:shade val="50000"/>
+              </a:schemeClr>
+            </a:lnRef>
+            <a:fillRef idx="1">
+              <a:schemeClr val="accent1"/>
+            </a:fillRef>
+            <a:effectRef idx="0">
+              <a:schemeClr val="accent1"/>
+            </a:effectRef>
+            <a:fontRef idx="minor">
+              <a:schemeClr val="lt1"/>
+            </a:fontRef>
+          </p:style>
+          <p:txBody>
+            <a:bodyPr rtlCol="0" anchor="ctr"/>
+            <a:lstStyle/>
+            <a:p>
+              <a:pPr algn="ctr"/>
+              <a:endParaRPr lang="en-US"/>
+            </a:p>
+          </p:txBody>
+        </p:sp>
+      </p:grpSp>
+      <p:grpSp>
+        <p:nvGrpSpPr>
+          <p:cNvPr id="51" name="Group 50">
+            <a:extLst>
+              <a:ext uri="{FF2B5EF4-FFF2-40B4-BE49-F238E27FC236}">
+                <a16:creationId xmlns:a16="http://schemas.microsoft.com/office/drawing/2014/main" id="{DA2AB630-4048-AA56-887E-7D5C22D23330}"/>
+              </a:ext>
+            </a:extLst>
+          </p:cNvPr>
+          <p:cNvGrpSpPr/>
+          <p:nvPr/>
+        </p:nvGrpSpPr>
+        <p:grpSpPr>
+          <a:xfrm>
+            <a:off x="19639597" y="24356129"/>
+            <a:ext cx="998207" cy="1430267"/>
+            <a:chOff x="18072345" y="24359592"/>
+            <a:chExt cx="998207" cy="1430267"/>
+          </a:xfrm>
+        </p:grpSpPr>
+        <p:pic>
+          <p:nvPicPr>
+            <p:cNvPr id="52" name="Graphic 51">
+              <a:extLst>
+                <a:ext uri="{FF2B5EF4-FFF2-40B4-BE49-F238E27FC236}">
+                  <a16:creationId xmlns:a16="http://schemas.microsoft.com/office/drawing/2014/main" id="{46FDAE02-4665-B5AD-CCE8-D2C7EDDCAADC}"/>
+                </a:ext>
+              </a:extLst>
+            </p:cNvPr>
+            <p:cNvPicPr>
+              <a:picLocks noChangeAspect="1"/>
+            </p:cNvPicPr>
+            <p:nvPr/>
+          </p:nvPicPr>
+          <p:blipFill>
+            <a:blip r:embed="rId21">
+              <a:extLst>
+                <a:ext uri="{96DAC541-7B7A-43D3-8B79-37D633B846F1}">
+                  <asvg:svgBlip xmlns:asvg="http://schemas.microsoft.com/office/drawing/2016/SVG/main" r:embed="rId22"/>
+                </a:ext>
+              </a:extLst>
+            </a:blip>
+            <a:stretch>
+              <a:fillRect/>
+            </a:stretch>
+          </p:blipFill>
+          <p:spPr>
+            <a:xfrm>
+              <a:off x="18072345" y="24359592"/>
+              <a:ext cx="998207" cy="1430267"/>
+            </a:xfrm>
+            <a:prstGeom prst="rect">
+              <a:avLst/>
+            </a:prstGeom>
+          </p:spPr>
+        </p:pic>
+        <p:sp>
+          <p:nvSpPr>
+            <p:cNvPr id="53" name="Rectangle 52">
+              <a:extLst>
+                <a:ext uri="{FF2B5EF4-FFF2-40B4-BE49-F238E27FC236}">
+                  <a16:creationId xmlns:a16="http://schemas.microsoft.com/office/drawing/2014/main" id="{71CC1DCF-43B2-4AC7-F956-9905796183DA}"/>
+                </a:ext>
+              </a:extLst>
+            </p:cNvPr>
+            <p:cNvSpPr/>
+            <p:nvPr/>
+          </p:nvSpPr>
+          <p:spPr>
+            <a:xfrm>
+              <a:off x="18464645" y="25094045"/>
+              <a:ext cx="207819" cy="62346"/>
+            </a:xfrm>
+            <a:prstGeom prst="rect">
+              <a:avLst/>
+            </a:prstGeom>
+            <a:solidFill>
+              <a:schemeClr val="bg1"/>
+            </a:solidFill>
+            <a:ln>
+              <a:solidFill>
+                <a:schemeClr val="bg1"/>
+              </a:solidFill>
+            </a:ln>
+          </p:spPr>
+          <p:style>
+            <a:lnRef idx="2">
+              <a:schemeClr val="accent1">
+                <a:shade val="50000"/>
+              </a:schemeClr>
+            </a:lnRef>
+            <a:fillRef idx="1">
+              <a:schemeClr val="accent1"/>
+            </a:fillRef>
+            <a:effectRef idx="0">
+              <a:schemeClr val="accent1"/>
+            </a:effectRef>
+            <a:fontRef idx="minor">
+              <a:schemeClr val="lt1"/>
+            </a:fontRef>
+          </p:style>
+          <p:txBody>
+            <a:bodyPr rtlCol="0" anchor="ctr"/>
+            <a:lstStyle/>
+            <a:p>
+              <a:pPr algn="ctr"/>
+              <a:endParaRPr lang="en-US"/>
+            </a:p>
+          </p:txBody>
+        </p:sp>
+      </p:grpSp>
+      <p:grpSp>
+        <p:nvGrpSpPr>
+          <p:cNvPr id="47" name="Group 46">
+            <a:extLst>
+              <a:ext uri="{FF2B5EF4-FFF2-40B4-BE49-F238E27FC236}">
+                <a16:creationId xmlns:a16="http://schemas.microsoft.com/office/drawing/2014/main" id="{5E93B341-8973-0DAC-D070-535E15E33D10}"/>
+              </a:ext>
+            </a:extLst>
+          </p:cNvPr>
+          <p:cNvGrpSpPr/>
+          <p:nvPr/>
+        </p:nvGrpSpPr>
+        <p:grpSpPr>
+          <a:xfrm>
+            <a:off x="17565523" y="24353838"/>
+            <a:ext cx="998207" cy="1430267"/>
+            <a:chOff x="18072345" y="24359592"/>
+            <a:chExt cx="998207" cy="1430267"/>
+          </a:xfrm>
+        </p:grpSpPr>
+        <p:pic>
+          <p:nvPicPr>
+            <p:cNvPr id="54" name="Graphic 53">
+              <a:extLst>
+                <a:ext uri="{FF2B5EF4-FFF2-40B4-BE49-F238E27FC236}">
+                  <a16:creationId xmlns:a16="http://schemas.microsoft.com/office/drawing/2014/main" id="{0E70F6D8-3E39-496B-91D0-EC1F87D5C2E8}"/>
+                </a:ext>
+              </a:extLst>
+            </p:cNvPr>
+            <p:cNvPicPr>
+              <a:picLocks noChangeAspect="1"/>
+            </p:cNvPicPr>
+            <p:nvPr/>
+          </p:nvPicPr>
+          <p:blipFill>
+            <a:blip r:embed="rId21">
+              <a:extLst>
+                <a:ext uri="{96DAC541-7B7A-43D3-8B79-37D633B846F1}">
+                  <asvg:svgBlip xmlns:asvg="http://schemas.microsoft.com/office/drawing/2016/SVG/main" r:embed="rId22"/>
+                </a:ext>
+              </a:extLst>
+            </a:blip>
+            <a:stretch>
+              <a:fillRect/>
+            </a:stretch>
+          </p:blipFill>
+          <p:spPr>
+            <a:xfrm>
+              <a:off x="18072345" y="24359592"/>
+              <a:ext cx="998207" cy="1430267"/>
+            </a:xfrm>
+            <a:prstGeom prst="rect">
+              <a:avLst/>
+            </a:prstGeom>
+          </p:spPr>
+        </p:pic>
+        <p:sp>
+          <p:nvSpPr>
+            <p:cNvPr id="55" name="Rectangle 54">
+              <a:extLst>
+                <a:ext uri="{FF2B5EF4-FFF2-40B4-BE49-F238E27FC236}">
+                  <a16:creationId xmlns:a16="http://schemas.microsoft.com/office/drawing/2014/main" id="{65028E7A-6564-7AB8-2E62-06D17F0E73D1}"/>
+                </a:ext>
+              </a:extLst>
+            </p:cNvPr>
+            <p:cNvSpPr/>
+            <p:nvPr/>
+          </p:nvSpPr>
+          <p:spPr>
+            <a:xfrm>
+              <a:off x="18464645" y="25094045"/>
+              <a:ext cx="207819" cy="62346"/>
+            </a:xfrm>
+            <a:prstGeom prst="rect">
+              <a:avLst/>
+            </a:prstGeom>
+            <a:solidFill>
+              <a:schemeClr val="bg1"/>
+            </a:solidFill>
+            <a:ln>
+              <a:solidFill>
+                <a:schemeClr val="bg1"/>
+              </a:solidFill>
+            </a:ln>
+          </p:spPr>
+          <p:style>
+            <a:lnRef idx="2">
+              <a:schemeClr val="accent1">
+                <a:shade val="50000"/>
+              </a:schemeClr>
+            </a:lnRef>
+            <a:fillRef idx="1">
+              <a:schemeClr val="accent1"/>
+            </a:fillRef>
+            <a:effectRef idx="0">
+              <a:schemeClr val="accent1"/>
+            </a:effectRef>
+            <a:fontRef idx="minor">
+              <a:schemeClr val="lt1"/>
+            </a:fontRef>
+          </p:style>
+          <p:txBody>
+            <a:bodyPr rtlCol="0" anchor="ctr"/>
+            <a:lstStyle/>
+            <a:p>
+              <a:pPr algn="ctr"/>
+              <a:endParaRPr lang="en-US"/>
+            </a:p>
+          </p:txBody>
+        </p:sp>
+      </p:grpSp>
+      <p:pic>
+        <p:nvPicPr>
+          <p:cNvPr id="15" name="Graphic 14">
+            <a:extLst>
+              <a:ext uri="{FF2B5EF4-FFF2-40B4-BE49-F238E27FC236}">
+                <a16:creationId xmlns:a16="http://schemas.microsoft.com/office/drawing/2014/main" id="{63C64B97-9D8D-1B8D-A1A8-8C90AF937EA5}"/>
+              </a:ext>
+            </a:extLst>
+          </p:cNvPr>
+          <p:cNvPicPr>
+            <a:picLocks noChangeAspect="1"/>
+          </p:cNvPicPr>
+          <p:nvPr/>
+        </p:nvPicPr>
+        <p:blipFill>
+          <a:blip r:embed="rId23">
+            <a:extLst>
+              <a:ext uri="{96DAC541-7B7A-43D3-8B79-37D633B846F1}">
+                <asvg:svgBlip xmlns:asvg="http://schemas.microsoft.com/office/drawing/2016/SVG/main" r:embed="rId24"/>
+              </a:ext>
+            </a:extLst>
+          </a:blip>
+          <a:stretch>
+            <a:fillRect/>
+          </a:stretch>
+        </p:blipFill>
+        <p:spPr>
+          <a:xfrm>
+            <a:off x="14388678" y="38272721"/>
+            <a:ext cx="3569145" cy="3569145"/>
+          </a:xfrm>
+          <a:prstGeom prst="rect">
+            <a:avLst/>
+          </a:prstGeom>
+        </p:spPr>
+      </p:pic>
     </p:spTree>
     <p:extLst>
       <p:ext uri="{BB962C8B-B14F-4D97-AF65-F5344CB8AC3E}">

</xml_diff>